<commit_message>
Final Presentation, please update the slides with more information
</commit_message>
<xml_diff>
--- a/documentation/Phase 3 Docs/Final Presentation.pptx
+++ b/documentation/Phase 3 Docs/Final Presentation.pptx
@@ -4529,7 +4529,7 @@
                 <a16:creationId xmlns:a16="http://schemas.microsoft.com/office/drawing/2014/main" id="{35555856-9970-4BC3-9AA9-6A917F53AFBD}"/>
               </a:ext>
               <a:ext uri="{C183D7F6-B498-43B3-948B-1728B52AA6E4}">
-                <adec:decorative xmlns:adec="http://schemas.microsoft.com/office/drawing/2017/decorative" xmlns="" val="1"/>
+                <adec:decorative xmlns="" xmlns:adec="http://schemas.microsoft.com/office/drawing/2017/decorative" val="1"/>
               </a:ext>
             </a:extLst>
           </p:cNvPr>
@@ -4615,7 +4615,7 @@
                 <a16:creationId xmlns:a16="http://schemas.microsoft.com/office/drawing/2014/main" id="{7F487851-BFAF-46D8-A1ED-50CAD6E46F59}"/>
               </a:ext>
               <a:ext uri="{C183D7F6-B498-43B3-948B-1728B52AA6E4}">
-                <adec:decorative xmlns:adec="http://schemas.microsoft.com/office/drawing/2017/decorative" xmlns="" val="1"/>
+                <adec:decorative xmlns="" xmlns:adec="http://schemas.microsoft.com/office/drawing/2017/decorative" val="1"/>
               </a:ext>
             </a:extLst>
           </p:cNvPr>
@@ -4890,7 +4890,7 @@
                 <a16:creationId xmlns:a16="http://schemas.microsoft.com/office/drawing/2014/main" id="{13722DD7-BA73-4776-93A3-94491FEF7260}"/>
               </a:ext>
               <a:ext uri="{C183D7F6-B498-43B3-948B-1728B52AA6E4}">
-                <adec:decorative xmlns:adec="http://schemas.microsoft.com/office/drawing/2017/decorative" xmlns="" val="1"/>
+                <adec:decorative xmlns="" xmlns:adec="http://schemas.microsoft.com/office/drawing/2017/decorative" val="1"/>
               </a:ext>
             </a:extLst>
           </p:cNvPr>
@@ -5162,7 +5162,7 @@
                 <a16:creationId xmlns:a16="http://schemas.microsoft.com/office/drawing/2014/main" id="{4351DFE5-F63D-4BE0-BDA9-E3EB88F01AA5}"/>
               </a:ext>
               <a:ext uri="{C183D7F6-B498-43B3-948B-1728B52AA6E4}">
-                <adec:decorative xmlns:adec="http://schemas.microsoft.com/office/drawing/2017/decorative" xmlns="" val="1"/>
+                <adec:decorative xmlns="" xmlns:adec="http://schemas.microsoft.com/office/drawing/2017/decorative" val="1"/>
               </a:ext>
             </a:extLst>
           </p:cNvPr>
@@ -5247,7 +5247,7 @@
                 <a16:creationId xmlns:a16="http://schemas.microsoft.com/office/drawing/2014/main" id="{3AA16612-ACD2-4A16-8F2B-4514FD6BF28F}"/>
               </a:ext>
               <a:ext uri="{C183D7F6-B498-43B3-948B-1728B52AA6E4}">
-                <adec:decorative xmlns:adec="http://schemas.microsoft.com/office/drawing/2017/decorative" xmlns="" val="1"/>
+                <adec:decorative xmlns="" xmlns:adec="http://schemas.microsoft.com/office/drawing/2017/decorative" val="1"/>
               </a:ext>
             </a:extLst>
           </p:cNvPr>
@@ -5319,15 +5319,7 @@
                   <a:srgbClr val="FFFFFF"/>
                 </a:solidFill>
               </a:rPr>
-              <a:t>Final</a:t>
-            </a:r>
-            <a:r>
-              <a:rPr lang="en-US" sz="4000" dirty="0" smtClean="0">
-                <a:solidFill>
-                  <a:srgbClr val="FFFFFF"/>
-                </a:solidFill>
-              </a:rPr>
-              <a:t> </a:t>
+              <a:t>Final </a:t>
             </a:r>
             <a:r>
               <a:rPr lang="en-US" sz="4000" dirty="0">
@@ -5493,7 +5485,7 @@
                 <a16:creationId xmlns:a16="http://schemas.microsoft.com/office/drawing/2014/main" id="{4351DFE5-F63D-4BE0-BDA9-E3EB88F01AA5}"/>
               </a:ext>
               <a:ext uri="{C183D7F6-B498-43B3-948B-1728B52AA6E4}">
-                <adec:decorative xmlns:adec="http://schemas.microsoft.com/office/drawing/2017/decorative" xmlns="" val="1"/>
+                <adec:decorative xmlns="" xmlns:adec="http://schemas.microsoft.com/office/drawing/2017/decorative" val="1"/>
               </a:ext>
             </a:extLst>
           </p:cNvPr>
@@ -5578,7 +5570,7 @@
                 <a16:creationId xmlns:a16="http://schemas.microsoft.com/office/drawing/2014/main" id="{3AA16612-ACD2-4A16-8F2B-4514FD6BF28F}"/>
               </a:ext>
               <a:ext uri="{C183D7F6-B498-43B3-948B-1728B52AA6E4}">
-                <adec:decorative xmlns:adec="http://schemas.microsoft.com/office/drawing/2017/decorative" xmlns="" val="1"/>
+                <adec:decorative xmlns="" xmlns:adec="http://schemas.microsoft.com/office/drawing/2017/decorative" val="1"/>
               </a:ext>
             </a:extLst>
           </p:cNvPr>
@@ -5750,7 +5742,7 @@
                 <a16:creationId xmlns:a16="http://schemas.microsoft.com/office/drawing/2014/main" id="{4351DFE5-F63D-4BE0-BDA9-E3EB88F01AA5}"/>
               </a:ext>
               <a:ext uri="{C183D7F6-B498-43B3-948B-1728B52AA6E4}">
-                <adec:decorative xmlns:adec="http://schemas.microsoft.com/office/drawing/2017/decorative" xmlns="" val="1"/>
+                <adec:decorative xmlns="" xmlns:adec="http://schemas.microsoft.com/office/drawing/2017/decorative" val="1"/>
               </a:ext>
             </a:extLst>
           </p:cNvPr>
@@ -5835,7 +5827,7 @@
                 <a16:creationId xmlns:a16="http://schemas.microsoft.com/office/drawing/2014/main" id="{3AA16612-ACD2-4A16-8F2B-4514FD6BF28F}"/>
               </a:ext>
               <a:ext uri="{C183D7F6-B498-43B3-948B-1728B52AA6E4}">
-                <adec:decorative xmlns:adec="http://schemas.microsoft.com/office/drawing/2017/decorative" xmlns="" val="1"/>
+                <adec:decorative xmlns="" xmlns:adec="http://schemas.microsoft.com/office/drawing/2017/decorative" val="1"/>
               </a:ext>
             </a:extLst>
           </p:cNvPr>
@@ -6007,7 +5999,7 @@
                 <a16:creationId xmlns:a16="http://schemas.microsoft.com/office/drawing/2014/main" id="{4351DFE5-F63D-4BE0-BDA9-E3EB88F01AA5}"/>
               </a:ext>
               <a:ext uri="{C183D7F6-B498-43B3-948B-1728B52AA6E4}">
-                <adec:decorative xmlns:adec="http://schemas.microsoft.com/office/drawing/2017/decorative" xmlns="" val="1"/>
+                <adec:decorative xmlns="" xmlns:adec="http://schemas.microsoft.com/office/drawing/2017/decorative" val="1"/>
               </a:ext>
             </a:extLst>
           </p:cNvPr>
@@ -6092,7 +6084,7 @@
                 <a16:creationId xmlns:a16="http://schemas.microsoft.com/office/drawing/2014/main" id="{3AA16612-ACD2-4A16-8F2B-4514FD6BF28F}"/>
               </a:ext>
               <a:ext uri="{C183D7F6-B498-43B3-948B-1728B52AA6E4}">
-                <adec:decorative xmlns:adec="http://schemas.microsoft.com/office/drawing/2017/decorative" xmlns="" val="1"/>
+                <adec:decorative xmlns="" xmlns:adec="http://schemas.microsoft.com/office/drawing/2017/decorative" val="1"/>
               </a:ext>
             </a:extLst>
           </p:cNvPr>
@@ -6199,11 +6191,15 @@
           <a:p>
             <a:r>
               <a:rPr lang="nl-NL" dirty="0"/>
-              <a:t>Made experiments by modifying parameters, then measured the </a:t>
-            </a:r>
-            <a:r>
-              <a:rPr lang="nl-NL" dirty="0" smtClean="0"/>
-              <a:t>result</a:t>
+              <a:t>Made experiments by modifying parameters, then measured </a:t>
+            </a:r>
+            <a:r>
+              <a:rPr lang="nl-NL"/>
+              <a:t>the </a:t>
+            </a:r>
+            <a:r>
+              <a:rPr lang="nl-NL" smtClean="0"/>
+              <a:t>result.</a:t>
             </a:r>
             <a:endParaRPr lang="nl-NL" dirty="0"/>
           </a:p>
@@ -6255,7 +6251,7 @@
                 <a16:creationId xmlns:a16="http://schemas.microsoft.com/office/drawing/2014/main" id="{4351DFE5-F63D-4BE0-BDA9-E3EB88F01AA5}"/>
               </a:ext>
               <a:ext uri="{C183D7F6-B498-43B3-948B-1728B52AA6E4}">
-                <adec:decorative xmlns:adec="http://schemas.microsoft.com/office/drawing/2017/decorative" xmlns="" val="1"/>
+                <adec:decorative xmlns="" xmlns:adec="http://schemas.microsoft.com/office/drawing/2017/decorative" val="1"/>
               </a:ext>
             </a:extLst>
           </p:cNvPr>
@@ -6340,7 +6336,7 @@
                 <a16:creationId xmlns:a16="http://schemas.microsoft.com/office/drawing/2014/main" id="{3AA16612-ACD2-4A16-8F2B-4514FD6BF28F}"/>
               </a:ext>
               <a:ext uri="{C183D7F6-B498-43B3-948B-1728B52AA6E4}">
-                <adec:decorative xmlns:adec="http://schemas.microsoft.com/office/drawing/2017/decorative" xmlns="" val="1"/>
+                <adec:decorative xmlns="" xmlns:adec="http://schemas.microsoft.com/office/drawing/2017/decorative" val="1"/>
               </a:ext>
             </a:extLst>
           </p:cNvPr>
@@ -6496,7 +6492,7 @@
                 <a16:creationId xmlns:a16="http://schemas.microsoft.com/office/drawing/2014/main" id="{4351DFE5-F63D-4BE0-BDA9-E3EB88F01AA5}"/>
               </a:ext>
               <a:ext uri="{C183D7F6-B498-43B3-948B-1728B52AA6E4}">
-                <adec:decorative xmlns:adec="http://schemas.microsoft.com/office/drawing/2017/decorative" xmlns="" val="1"/>
+                <adec:decorative xmlns="" xmlns:adec="http://schemas.microsoft.com/office/drawing/2017/decorative" val="1"/>
               </a:ext>
             </a:extLst>
           </p:cNvPr>
@@ -6581,7 +6577,7 @@
                 <a16:creationId xmlns:a16="http://schemas.microsoft.com/office/drawing/2014/main" id="{3AA16612-ACD2-4A16-8F2B-4514FD6BF28F}"/>
               </a:ext>
               <a:ext uri="{C183D7F6-B498-43B3-948B-1728B52AA6E4}">
-                <adec:decorative xmlns:adec="http://schemas.microsoft.com/office/drawing/2017/decorative" xmlns="" val="1"/>
+                <adec:decorative xmlns="" xmlns:adec="http://schemas.microsoft.com/office/drawing/2017/decorative" val="1"/>
               </a:ext>
             </a:extLst>
           </p:cNvPr>
@@ -6742,7 +6738,7 @@
                 <a16:creationId xmlns:a16="http://schemas.microsoft.com/office/drawing/2014/main" id="{5434194B-EB56-4062-98C6-CB72F287E3F7}"/>
               </a:ext>
               <a:ext uri="{C183D7F6-B498-43B3-948B-1728B52AA6E4}">
-                <adec:decorative xmlns:adec="http://schemas.microsoft.com/office/drawing/2017/decorative" xmlns="" val="1"/>
+                <adec:decorative xmlns="" xmlns:adec="http://schemas.microsoft.com/office/drawing/2017/decorative" val="1"/>
               </a:ext>
             </a:extLst>
           </p:cNvPr>
@@ -6828,7 +6824,7 @@
                 <a16:creationId xmlns:a16="http://schemas.microsoft.com/office/drawing/2014/main" id="{B3746DB1-35A8-422F-9955-4F8E75DBB077}"/>
               </a:ext>
               <a:ext uri="{C183D7F6-B498-43B3-948B-1728B52AA6E4}">
-                <adec:decorative xmlns:adec="http://schemas.microsoft.com/office/drawing/2017/decorative" xmlns="" val="1"/>
+                <adec:decorative xmlns="" xmlns:adec="http://schemas.microsoft.com/office/drawing/2017/decorative" val="1"/>
               </a:ext>
             </a:extLst>
           </p:cNvPr>
@@ -6913,7 +6909,7 @@
                 <a16:creationId xmlns:a16="http://schemas.microsoft.com/office/drawing/2014/main" id="{B817D9AD-5E85-4E85-AC3E-43E24FA91AA1}"/>
               </a:ext>
               <a:ext uri="{C183D7F6-B498-43B3-948B-1728B52AA6E4}">
-                <adec:decorative xmlns:adec="http://schemas.microsoft.com/office/drawing/2017/decorative" xmlns="" val="1"/>
+                <adec:decorative xmlns="" xmlns:adec="http://schemas.microsoft.com/office/drawing/2017/decorative" val="1"/>
               </a:ext>
             </a:extLst>
           </p:cNvPr>
@@ -7121,7 +7117,7 @@
                 <a16:creationId xmlns:a16="http://schemas.microsoft.com/office/drawing/2014/main" id="{F0810290-E788-4DE3-B716-DBE58CC6A8EF}"/>
               </a:ext>
               <a:ext uri="{C183D7F6-B498-43B3-948B-1728B52AA6E4}">
-                <adec:decorative xmlns:adec="http://schemas.microsoft.com/office/drawing/2017/decorative" xmlns="" val="1"/>
+                <adec:decorative xmlns="" xmlns:adec="http://schemas.microsoft.com/office/drawing/2017/decorative" val="1"/>
               </a:ext>
             </a:extLst>
           </p:cNvPr>
@@ -7300,7 +7296,7 @@
                 <a14:useLocalDpi xmlns:a14="http://schemas.microsoft.com/office/drawing/2010/main" val="0"/>
               </a:ext>
               <a:ext uri="{96DAC541-7B7A-43D3-8B79-37D633B846F1}">
-                <asvg:svgBlip xmlns:asvg="http://schemas.microsoft.com/office/drawing/2016/SVG/main" xmlns="" r:embed="rId7"/>
+                <asvg:svgBlip xmlns="" xmlns:asvg="http://schemas.microsoft.com/office/drawing/2016/SVG/main" r:embed="rId7"/>
               </a:ext>
             </a:extLst>
           </a:blip>

</xml_diff>